<commit_message>
Updating Day 21 and Day 22 ppts and adding constraints and normalization example sql files
</commit_message>
<xml_diff>
--- a/powerpoints/Day_22.pptx
+++ b/powerpoints/Day_22.pptx
@@ -5,7 +5,7 @@
     <p:sldMasterId id="2147483690" r:id="rId1"/>
   </p:sldMasterIdLst>
   <p:notesMasterIdLst>
-    <p:notesMasterId r:id="rId19"/>
+    <p:notesMasterId r:id="rId21"/>
   </p:notesMasterIdLst>
   <p:sldIdLst>
     <p:sldId id="256" r:id="rId2"/>
@@ -20,11 +20,13 @@
     <p:sldId id="316" r:id="rId11"/>
     <p:sldId id="304" r:id="rId12"/>
     <p:sldId id="313" r:id="rId13"/>
-    <p:sldId id="306" r:id="rId14"/>
-    <p:sldId id="314" r:id="rId15"/>
-    <p:sldId id="318" r:id="rId16"/>
-    <p:sldId id="319" r:id="rId17"/>
-    <p:sldId id="270" r:id="rId18"/>
+    <p:sldId id="321" r:id="rId14"/>
+    <p:sldId id="306" r:id="rId15"/>
+    <p:sldId id="314" r:id="rId16"/>
+    <p:sldId id="318" r:id="rId17"/>
+    <p:sldId id="320" r:id="rId18"/>
+    <p:sldId id="319" r:id="rId19"/>
+    <p:sldId id="270" r:id="rId20"/>
   </p:sldIdLst>
   <p:sldSz cx="9144000" cy="6858000" type="screen4x3"/>
   <p:notesSz cx="7010400" cy="9296400"/>
@@ -347,7 +349,7 @@
           <a:p>
             <a:fld id="{444FBF54-D46F-48F7-AC61-EED38DB2F72A}" type="datetimeFigureOut">
               <a:rPr lang="en-US" smtClean="0"/>
-              <a:t>4/30/2021</a:t>
+              <a:t>10/13/2021</a:t>
             </a:fld>
             <a:endParaRPr lang="en-US"/>
           </a:p>
@@ -38583,6 +38585,517 @@
           <a:p>
             <a:r>
               <a:rPr lang="en-US" dirty="0"/>
+              <a:t>Sequences &amp; DDL</a:t>
+            </a:r>
+          </a:p>
+        </p:txBody>
+      </p:sp>
+      <p:sp>
+        <p:nvSpPr>
+          <p:cNvPr id="3" name="Text Placeholder 2">
+            <a:extLst>
+              <a:ext uri="{FF2B5EF4-FFF2-40B4-BE49-F238E27FC236}">
+                <a16:creationId xmlns:a16="http://schemas.microsoft.com/office/drawing/2014/main" id="{0C6BA468-B2FB-4410-8CC4-82872A4103B6}"/>
+              </a:ext>
+            </a:extLst>
+          </p:cNvPr>
+          <p:cNvSpPr>
+            <a:spLocks noGrp="1"/>
+          </p:cNvSpPr>
+          <p:nvPr>
+            <p:ph type="body" idx="1"/>
+          </p:nvPr>
+        </p:nvSpPr>
+        <p:spPr>
+          <a:xfrm>
+            <a:off x="380010" y="1481446"/>
+            <a:ext cx="8383980" cy="1639258"/>
+          </a:xfrm>
+        </p:spPr>
+        <p:txBody>
+          <a:bodyPr>
+            <a:normAutofit/>
+          </a:bodyPr>
+          <a:lstStyle/>
+          <a:p>
+            <a:r>
+              <a:rPr lang="en-US" dirty="0"/>
+              <a:t>Additionally, Sequences can be used in place of the serial datatype when defining Database tables:</a:t>
+            </a:r>
+          </a:p>
+        </p:txBody>
+      </p:sp>
+      <p:sp>
+        <p:nvSpPr>
+          <p:cNvPr id="4" name="Slide Number Placeholder 3">
+            <a:extLst>
+              <a:ext uri="{FF2B5EF4-FFF2-40B4-BE49-F238E27FC236}">
+                <a16:creationId xmlns:a16="http://schemas.microsoft.com/office/drawing/2014/main" id="{483A7CCD-D4F0-4527-9651-963B2389435E}"/>
+              </a:ext>
+            </a:extLst>
+          </p:cNvPr>
+          <p:cNvSpPr>
+            <a:spLocks noGrp="1"/>
+          </p:cNvSpPr>
+          <p:nvPr>
+            <p:ph type="sldNum" idx="12"/>
+          </p:nvPr>
+        </p:nvSpPr>
+        <p:spPr/>
+        <p:txBody>
+          <a:bodyPr/>
+          <a:lstStyle/>
+          <a:p>
+            <a:pPr marL="0" lvl="0" indent="0" algn="r" rtl="0">
+              <a:spcBef>
+                <a:spcPts val="0"/>
+              </a:spcBef>
+              <a:spcAft>
+                <a:spcPts val="0"/>
+              </a:spcAft>
+              <a:buNone/>
+            </a:pPr>
+            <a:fld id="{00000000-1234-1234-1234-123412341234}" type="slidenum">
+              <a:rPr lang="en-US" smtClean="0"/>
+              <a:t>12</a:t>
+            </a:fld>
+            <a:endParaRPr lang="en-US"/>
+          </a:p>
+        </p:txBody>
+      </p:sp>
+      <p:sp>
+        <p:nvSpPr>
+          <p:cNvPr id="5" name="Rectangle 4">
+            <a:extLst>
+              <a:ext uri="{FF2B5EF4-FFF2-40B4-BE49-F238E27FC236}">
+                <a16:creationId xmlns:a16="http://schemas.microsoft.com/office/drawing/2014/main" id="{5FE61E73-A4C2-484F-A49B-EF692012DD67}"/>
+              </a:ext>
+            </a:extLst>
+          </p:cNvPr>
+          <p:cNvSpPr/>
+          <p:nvPr/>
+        </p:nvSpPr>
+        <p:spPr>
+          <a:xfrm>
+            <a:off x="1023458" y="3120704"/>
+            <a:ext cx="7099300" cy="2187429"/>
+          </a:xfrm>
+          <a:prstGeom prst="rect">
+            <a:avLst/>
+          </a:prstGeom>
+        </p:spPr>
+        <p:style>
+          <a:lnRef idx="1">
+            <a:schemeClr val="accent2"/>
+          </a:lnRef>
+          <a:fillRef idx="2">
+            <a:schemeClr val="accent2"/>
+          </a:fillRef>
+          <a:effectRef idx="1">
+            <a:schemeClr val="accent2"/>
+          </a:effectRef>
+          <a:fontRef idx="minor">
+            <a:schemeClr val="dk1"/>
+          </a:fontRef>
+        </p:style>
+        <p:txBody>
+          <a:bodyPr rtlCol="0" anchor="ctr">
+            <a:normAutofit/>
+          </a:bodyPr>
+          <a:lstStyle/>
+          <a:p>
+            <a:pPr defTabSz="228600"/>
+            <a:r>
+              <a:rPr lang="en-US" sz="1600" b="1" dirty="0">
+                <a:latin typeface="+mj-lt"/>
+                <a:cs typeface="Courier New" panose="02070309020205020404" pitchFamily="49" charset="0"/>
+              </a:rPr>
+              <a:t>CREATE</a:t>
+            </a:r>
+            <a:r>
+              <a:rPr lang="en-US" sz="1600" dirty="0">
+                <a:latin typeface="+mj-lt"/>
+                <a:cs typeface="Courier New" panose="02070309020205020404" pitchFamily="49" charset="0"/>
+              </a:rPr>
+              <a:t> </a:t>
+            </a:r>
+            <a:r>
+              <a:rPr lang="en-US" sz="1600" b="1" dirty="0">
+                <a:latin typeface="+mj-lt"/>
+                <a:cs typeface="Courier New" panose="02070309020205020404" pitchFamily="49" charset="0"/>
+              </a:rPr>
+              <a:t>SEQUENCE</a:t>
+            </a:r>
+            <a:r>
+              <a:rPr lang="en-US" sz="1600" dirty="0">
+                <a:latin typeface="+mj-lt"/>
+                <a:cs typeface="Courier New" panose="02070309020205020404" pitchFamily="49" charset="0"/>
+              </a:rPr>
+              <a:t> </a:t>
+            </a:r>
+            <a:r>
+              <a:rPr lang="en-US" sz="1600" dirty="0" err="1">
+                <a:latin typeface="+mj-lt"/>
+                <a:cs typeface="Courier New" panose="02070309020205020404" pitchFamily="49" charset="0"/>
+              </a:rPr>
+              <a:t>emp_id_seq</a:t>
+            </a:r>
+            <a:r>
+              <a:rPr lang="en-US" sz="1600" dirty="0">
+                <a:latin typeface="+mj-lt"/>
+                <a:cs typeface="Courier New" panose="02070309020205020404" pitchFamily="49" charset="0"/>
+              </a:rPr>
+              <a:t>	</a:t>
+            </a:r>
+            <a:r>
+              <a:rPr lang="en-US" sz="1600" b="1" dirty="0">
+                <a:latin typeface="+mj-lt"/>
+                <a:cs typeface="Courier New" panose="02070309020205020404" pitchFamily="49" charset="0"/>
+              </a:rPr>
+              <a:t>START WITH</a:t>
+            </a:r>
+            <a:r>
+              <a:rPr lang="en-US" sz="1600" dirty="0">
+                <a:latin typeface="+mj-lt"/>
+                <a:cs typeface="Courier New" panose="02070309020205020404" pitchFamily="49" charset="0"/>
+              </a:rPr>
+              <a:t> 2000 </a:t>
+            </a:r>
+            <a:r>
+              <a:rPr lang="en-US" sz="1600" b="1" dirty="0">
+                <a:latin typeface="+mj-lt"/>
+                <a:cs typeface="Courier New" panose="02070309020205020404" pitchFamily="49" charset="0"/>
+              </a:rPr>
+              <a:t>INCREMENT BY</a:t>
+            </a:r>
+            <a:r>
+              <a:rPr lang="en-US" sz="1600" dirty="0">
+                <a:latin typeface="+mj-lt"/>
+                <a:cs typeface="Courier New" panose="02070309020205020404" pitchFamily="49" charset="0"/>
+              </a:rPr>
+              <a:t> 1;</a:t>
+            </a:r>
+          </a:p>
+          <a:p>
+            <a:pPr defTabSz="228600"/>
+            <a:endParaRPr lang="en-US" sz="1600" b="1" dirty="0">
+              <a:latin typeface="+mj-lt"/>
+              <a:cs typeface="Courier New" panose="02070309020205020404" pitchFamily="49" charset="0"/>
+            </a:endParaRPr>
+          </a:p>
+          <a:p>
+            <a:pPr defTabSz="228600"/>
+            <a:r>
+              <a:rPr lang="en-US" sz="1600" b="1" dirty="0">
+                <a:latin typeface="+mj-lt"/>
+                <a:cs typeface="Courier New" panose="02070309020205020404" pitchFamily="49" charset="0"/>
+              </a:rPr>
+              <a:t>CREATE TABLE </a:t>
+            </a:r>
+            <a:r>
+              <a:rPr lang="en-US" sz="1600" dirty="0" err="1">
+                <a:latin typeface="+mj-lt"/>
+                <a:cs typeface="Courier New" panose="02070309020205020404" pitchFamily="49" charset="0"/>
+              </a:rPr>
+              <a:t>examples.employees</a:t>
+            </a:r>
+            <a:r>
+              <a:rPr lang="en-US" sz="1600" dirty="0">
+                <a:latin typeface="+mj-lt"/>
+                <a:cs typeface="Courier New" panose="02070309020205020404" pitchFamily="49" charset="0"/>
+              </a:rPr>
+              <a:t> </a:t>
+            </a:r>
+            <a:r>
+              <a:rPr lang="en-US" sz="1600" b="1" dirty="0">
+                <a:latin typeface="+mj-lt"/>
+                <a:cs typeface="Courier New" panose="02070309020205020404" pitchFamily="49" charset="0"/>
+              </a:rPr>
+              <a:t>(</a:t>
+            </a:r>
+          </a:p>
+          <a:p>
+            <a:pPr defTabSz="228600"/>
+            <a:r>
+              <a:rPr lang="en-US" sz="1600" b="1" dirty="0">
+                <a:latin typeface="+mj-lt"/>
+                <a:cs typeface="Courier New" panose="02070309020205020404" pitchFamily="49" charset="0"/>
+              </a:rPr>
+              <a:t>	</a:t>
+            </a:r>
+            <a:r>
+              <a:rPr lang="en-US" sz="1600" dirty="0" err="1">
+                <a:latin typeface="+mj-lt"/>
+                <a:cs typeface="Courier New" panose="02070309020205020404" pitchFamily="49" charset="0"/>
+              </a:rPr>
+              <a:t>emp_id</a:t>
+            </a:r>
+            <a:r>
+              <a:rPr lang="en-US" sz="1600" dirty="0">
+                <a:latin typeface="+mj-lt"/>
+                <a:cs typeface="Courier New" panose="02070309020205020404" pitchFamily="49" charset="0"/>
+              </a:rPr>
+              <a:t> </a:t>
+            </a:r>
+            <a:r>
+              <a:rPr lang="en-US" sz="1600" b="1" dirty="0">
+                <a:latin typeface="+mj-lt"/>
+                <a:cs typeface="Courier New" panose="02070309020205020404" pitchFamily="49" charset="0"/>
+              </a:rPr>
+              <a:t>INTEGER DEFAULT </a:t>
+            </a:r>
+            <a:r>
+              <a:rPr lang="en-US" sz="1600" b="1" dirty="0" err="1">
+                <a:latin typeface="+mj-lt"/>
+                <a:cs typeface="Courier New" panose="02070309020205020404" pitchFamily="49" charset="0"/>
+              </a:rPr>
+              <a:t>nextval</a:t>
+            </a:r>
+            <a:r>
+              <a:rPr lang="en-US" sz="1600" b="1" dirty="0">
+                <a:latin typeface="+mj-lt"/>
+                <a:cs typeface="Courier New" panose="02070309020205020404" pitchFamily="49" charset="0"/>
+              </a:rPr>
+              <a:t>('</a:t>
+            </a:r>
+            <a:r>
+              <a:rPr lang="en-US" sz="1600" dirty="0" err="1">
+                <a:latin typeface="+mj-lt"/>
+                <a:cs typeface="Courier New" panose="02070309020205020404" pitchFamily="49" charset="0"/>
+              </a:rPr>
+              <a:t>emp_id_seq</a:t>
+            </a:r>
+            <a:r>
+              <a:rPr lang="en-US" sz="1600" b="1" dirty="0">
+                <a:latin typeface="+mj-lt"/>
+                <a:cs typeface="Courier New" panose="02070309020205020404" pitchFamily="49" charset="0"/>
+              </a:rPr>
+              <a:t>') PRIMARY KEY,</a:t>
+            </a:r>
+          </a:p>
+          <a:p>
+            <a:pPr defTabSz="228600"/>
+            <a:r>
+              <a:rPr lang="en-US" sz="1600" b="1" dirty="0">
+                <a:latin typeface="+mj-lt"/>
+                <a:cs typeface="Courier New" panose="02070309020205020404" pitchFamily="49" charset="0"/>
+              </a:rPr>
+              <a:t>	</a:t>
+            </a:r>
+            <a:r>
+              <a:rPr lang="en-US" sz="1600" dirty="0" err="1">
+                <a:latin typeface="+mj-lt"/>
+                <a:cs typeface="Courier New" panose="02070309020205020404" pitchFamily="49" charset="0"/>
+              </a:rPr>
+              <a:t>emp_name</a:t>
+            </a:r>
+            <a:r>
+              <a:rPr lang="en-US" sz="1600" b="1" dirty="0">
+                <a:latin typeface="+mj-lt"/>
+                <a:cs typeface="Courier New" panose="02070309020205020404" pitchFamily="49" charset="0"/>
+              </a:rPr>
+              <a:t> VARCHAR(200),</a:t>
+            </a:r>
+          </a:p>
+          <a:p>
+            <a:pPr defTabSz="228600"/>
+            <a:r>
+              <a:rPr lang="en-US" sz="1600" b="1" dirty="0">
+                <a:latin typeface="+mj-lt"/>
+                <a:cs typeface="Courier New" panose="02070309020205020404" pitchFamily="49" charset="0"/>
+              </a:rPr>
+              <a:t>	</a:t>
+            </a:r>
+            <a:r>
+              <a:rPr lang="en-US" sz="1600" dirty="0" err="1">
+                <a:latin typeface="+mj-lt"/>
+                <a:cs typeface="Courier New" panose="02070309020205020404" pitchFamily="49" charset="0"/>
+              </a:rPr>
+              <a:t>emp_title</a:t>
+            </a:r>
+            <a:r>
+              <a:rPr lang="en-US" sz="1600" b="1" dirty="0">
+                <a:latin typeface="+mj-lt"/>
+                <a:cs typeface="Courier New" panose="02070309020205020404" pitchFamily="49" charset="0"/>
+              </a:rPr>
+              <a:t> VARCHAR(50),</a:t>
+            </a:r>
+          </a:p>
+          <a:p>
+            <a:pPr defTabSz="228600"/>
+            <a:r>
+              <a:rPr lang="en-US" sz="1600" b="1" dirty="0">
+                <a:latin typeface="+mj-lt"/>
+                <a:cs typeface="Courier New" panose="02070309020205020404" pitchFamily="49" charset="0"/>
+              </a:rPr>
+              <a:t>	</a:t>
+            </a:r>
+            <a:r>
+              <a:rPr lang="en-US" sz="1600" dirty="0" err="1">
+                <a:latin typeface="+mj-lt"/>
+                <a:cs typeface="Courier New" panose="02070309020205020404" pitchFamily="49" charset="0"/>
+              </a:rPr>
+              <a:t>emp_salary</a:t>
+            </a:r>
+            <a:r>
+              <a:rPr lang="en-US" sz="1600" b="1" dirty="0">
+                <a:latin typeface="+mj-lt"/>
+                <a:cs typeface="Courier New" panose="02070309020205020404" pitchFamily="49" charset="0"/>
+              </a:rPr>
+              <a:t> NUMERIC</a:t>
+            </a:r>
+          </a:p>
+          <a:p>
+            <a:pPr defTabSz="228600"/>
+            <a:r>
+              <a:rPr lang="en-US" sz="1600" b="1" dirty="0">
+                <a:latin typeface="+mj-lt"/>
+                <a:cs typeface="Courier New" panose="02070309020205020404" pitchFamily="49" charset="0"/>
+              </a:rPr>
+              <a:t>);</a:t>
+            </a:r>
+            <a:endParaRPr lang="en-US" sz="1600" dirty="0">
+              <a:latin typeface="+mj-lt"/>
+              <a:cs typeface="Courier New" panose="02070309020205020404" pitchFamily="49" charset="0"/>
+            </a:endParaRPr>
+          </a:p>
+        </p:txBody>
+      </p:sp>
+    </p:spTree>
+    <p:extLst>
+      <p:ext uri="{BB962C8B-B14F-4D97-AF65-F5344CB8AC3E}">
+        <p14:creationId xmlns:p14="http://schemas.microsoft.com/office/powerpoint/2010/main" val="2831529375"/>
+      </p:ext>
+    </p:extLst>
+  </p:cSld>
+  <p:clrMapOvr>
+    <a:masterClrMapping/>
+  </p:clrMapOvr>
+  <p:timing>
+    <p:tnLst>
+      <p:par>
+        <p:cTn id="1" dur="indefinite" restart="never" nodeType="tmRoot">
+          <p:childTnLst>
+            <p:seq concurrent="1" nextAc="seek">
+              <p:cTn id="2" dur="indefinite" nodeType="mainSeq">
+                <p:childTnLst>
+                  <p:par>
+                    <p:cTn id="3" fill="hold">
+                      <p:stCondLst>
+                        <p:cond delay="indefinite"/>
+                      </p:stCondLst>
+                      <p:childTnLst>
+                        <p:par>
+                          <p:cTn id="4" fill="hold">
+                            <p:stCondLst>
+                              <p:cond delay="0"/>
+                            </p:stCondLst>
+                            <p:childTnLst>
+                              <p:par>
+                                <p:cTn id="5" presetID="1" presetClass="entr" presetSubtype="0" fill="hold" grpId="0" nodeType="clickEffect">
+                                  <p:stCondLst>
+                                    <p:cond delay="0"/>
+                                  </p:stCondLst>
+                                  <p:childTnLst>
+                                    <p:set>
+                                      <p:cBhvr>
+                                        <p:cTn id="6" dur="1" fill="hold">
+                                          <p:stCondLst>
+                                            <p:cond delay="0"/>
+                                          </p:stCondLst>
+                                        </p:cTn>
+                                        <p:tgtEl>
+                                          <p:spTgt spid="3">
+                                            <p:txEl>
+                                              <p:pRg st="0" end="0"/>
+                                            </p:txEl>
+                                          </p:spTgt>
+                                        </p:tgtEl>
+                                        <p:attrNameLst>
+                                          <p:attrName>style.visibility</p:attrName>
+                                        </p:attrNameLst>
+                                      </p:cBhvr>
+                                      <p:to>
+                                        <p:strVal val="visible"/>
+                                      </p:to>
+                                    </p:set>
+                                  </p:childTnLst>
+                                </p:cTn>
+                              </p:par>
+                            </p:childTnLst>
+                          </p:cTn>
+                        </p:par>
+                      </p:childTnLst>
+                    </p:cTn>
+                  </p:par>
+                </p:childTnLst>
+              </p:cTn>
+              <p:prevCondLst>
+                <p:cond evt="onPrev" delay="0">
+                  <p:tgtEl>
+                    <p:sldTgt/>
+                  </p:tgtEl>
+                </p:cond>
+              </p:prevCondLst>
+              <p:nextCondLst>
+                <p:cond evt="onNext" delay="0">
+                  <p:tgtEl>
+                    <p:sldTgt/>
+                  </p:tgtEl>
+                </p:cond>
+              </p:nextCondLst>
+            </p:seq>
+          </p:childTnLst>
+        </p:cTn>
+      </p:par>
+    </p:tnLst>
+    <p:bldLst>
+      <p:bldP spid="3" grpId="0" build="p"/>
+    </p:bldLst>
+  </p:timing>
+</p:sld>
+</file>
+
+<file path=ppt/slides/slide14.xml><?xml version="1.0" encoding="utf-8"?>
+<p:sld xmlns:a="http://schemas.openxmlformats.org/drawingml/2006/main" xmlns:r="http://schemas.openxmlformats.org/officeDocument/2006/relationships" xmlns:p="http://schemas.openxmlformats.org/presentationml/2006/main">
+  <p:cSld>
+    <p:spTree>
+      <p:nvGrpSpPr>
+        <p:cNvPr id="1" name=""/>
+        <p:cNvGrpSpPr/>
+        <p:nvPr/>
+      </p:nvGrpSpPr>
+      <p:grpSpPr>
+        <a:xfrm>
+          <a:off x="0" y="0"/>
+          <a:ext cx="0" cy="0"/>
+          <a:chOff x="0" y="0"/>
+          <a:chExt cx="0" cy="0"/>
+        </a:xfrm>
+      </p:grpSpPr>
+      <p:sp>
+        <p:nvSpPr>
+          <p:cNvPr id="2" name="Title 1">
+            <a:extLst>
+              <a:ext uri="{FF2B5EF4-FFF2-40B4-BE49-F238E27FC236}">
+                <a16:creationId xmlns:a16="http://schemas.microsoft.com/office/drawing/2014/main" id="{437930B4-E996-4435-B9F1-D407853E2C03}"/>
+              </a:ext>
+            </a:extLst>
+          </p:cNvPr>
+          <p:cNvSpPr>
+            <a:spLocks noGrp="1"/>
+          </p:cNvSpPr>
+          <p:nvPr>
+            <p:ph type="title"/>
+          </p:nvPr>
+        </p:nvSpPr>
+        <p:spPr/>
+        <p:txBody>
+          <a:bodyPr/>
+          <a:lstStyle/>
+          <a:p>
+            <a:r>
+              <a:rPr lang="en-US" dirty="0"/>
               <a:t>Triggers</a:t>
             </a:r>
           </a:p>
@@ -38701,7 +39214,7 @@
             </a:pPr>
             <a:fld id="{00000000-1234-1234-1234-123412341234}" type="slidenum">
               <a:rPr lang="en-US" smtClean="0"/>
-              <a:t>12</a:t>
+              <a:t>13</a:t>
             </a:fld>
             <a:endParaRPr lang="en-US"/>
           </a:p>
@@ -39073,7 +39586,7 @@
 </p:sld>
 </file>
 
-<file path=ppt/slides/slide14.xml><?xml version="1.0" encoding="utf-8"?>
+<file path=ppt/slides/slide15.xml><?xml version="1.0" encoding="utf-8"?>
 <p:sld xmlns:a="http://schemas.openxmlformats.org/drawingml/2006/main" xmlns:r="http://schemas.openxmlformats.org/officeDocument/2006/relationships" xmlns:p="http://schemas.openxmlformats.org/presentationml/2006/main">
   <p:cSld>
     <p:spTree>
@@ -39150,7 +39663,7 @@
             </a:pPr>
             <a:fld id="{00000000-1234-1234-1234-123412341234}" type="slidenum">
               <a:rPr lang="en-US" smtClean="0"/>
-              <a:t>13</a:t>
+              <a:t>14</a:t>
             </a:fld>
             <a:endParaRPr lang="en-US"/>
           </a:p>
@@ -39404,7 +39917,7 @@
 </p:sld>
 </file>
 
-<file path=ppt/slides/slide15.xml><?xml version="1.0" encoding="utf-8"?>
+<file path=ppt/slides/slide16.xml><?xml version="1.0" encoding="utf-8"?>
 <p:sld xmlns:a="http://schemas.openxmlformats.org/drawingml/2006/main" xmlns:r="http://schemas.openxmlformats.org/officeDocument/2006/relationships" xmlns:p="http://schemas.openxmlformats.org/presentationml/2006/main">
   <p:cSld>
     <p:spTree>
@@ -39553,7 +40066,7 @@
             <a:fld id="{F6728BC2-ACA3-447C-A909-F3F49211C066}" type="slidenum">
               <a:rPr lang="en-US" smtClean="0"/>
               <a:pPr/>
-              <a:t>14</a:t>
+              <a:t>15</a:t>
             </a:fld>
             <a:endParaRPr lang="en-US" dirty="0"/>
           </a:p>
@@ -39899,7 +40412,359 @@
 </p:sld>
 </file>
 
-<file path=ppt/slides/slide16.xml><?xml version="1.0" encoding="utf-8"?>
+<file path=ppt/slides/slide17.xml><?xml version="1.0" encoding="utf-8"?>
+<p:sld xmlns:a="http://schemas.openxmlformats.org/drawingml/2006/main" xmlns:r="http://schemas.openxmlformats.org/officeDocument/2006/relationships" xmlns:p="http://schemas.openxmlformats.org/presentationml/2006/main">
+  <p:cSld>
+    <p:spTree>
+      <p:nvGrpSpPr>
+        <p:cNvPr id="1" name=""/>
+        <p:cNvGrpSpPr/>
+        <p:nvPr/>
+      </p:nvGrpSpPr>
+      <p:grpSpPr>
+        <a:xfrm>
+          <a:off x="0" y="0"/>
+          <a:ext cx="0" cy="0"/>
+          <a:chOff x="0" y="0"/>
+          <a:chExt cx="0" cy="0"/>
+        </a:xfrm>
+      </p:grpSpPr>
+      <p:sp>
+        <p:nvSpPr>
+          <p:cNvPr id="2" name="Title 1">
+            <a:extLst>
+              <a:ext uri="{FF2B5EF4-FFF2-40B4-BE49-F238E27FC236}">
+                <a16:creationId xmlns:a16="http://schemas.microsoft.com/office/drawing/2014/main" id="{7C6DC7C6-CF44-4669-9CBB-E0B34F02A4FE}"/>
+              </a:ext>
+            </a:extLst>
+          </p:cNvPr>
+          <p:cNvSpPr>
+            <a:spLocks noGrp="1"/>
+          </p:cNvSpPr>
+          <p:nvPr>
+            <p:ph type="title"/>
+          </p:nvPr>
+        </p:nvSpPr>
+        <p:spPr/>
+        <p:txBody>
+          <a:bodyPr/>
+          <a:lstStyle/>
+          <a:p>
+            <a:r>
+              <a:rPr lang="en-US" dirty="0"/>
+              <a:t>VIEWS (Syntax)</a:t>
+            </a:r>
+          </a:p>
+        </p:txBody>
+      </p:sp>
+      <p:sp>
+        <p:nvSpPr>
+          <p:cNvPr id="4" name="Slide Number Placeholder 3">
+            <a:extLst>
+              <a:ext uri="{FF2B5EF4-FFF2-40B4-BE49-F238E27FC236}">
+                <a16:creationId xmlns:a16="http://schemas.microsoft.com/office/drawing/2014/main" id="{6E57852B-C496-48A1-9A81-51A9CCE56CD4}"/>
+              </a:ext>
+            </a:extLst>
+          </p:cNvPr>
+          <p:cNvSpPr>
+            <a:spLocks noGrp="1"/>
+          </p:cNvSpPr>
+          <p:nvPr>
+            <p:ph type="sldNum" sz="quarter" idx="12"/>
+          </p:nvPr>
+        </p:nvSpPr>
+        <p:spPr/>
+        <p:txBody>
+          <a:bodyPr/>
+          <a:lstStyle/>
+          <a:p>
+            <a:fld id="{F6728BC2-ACA3-447C-A909-F3F49211C066}" type="slidenum">
+              <a:rPr lang="en-US" smtClean="0"/>
+              <a:pPr/>
+              <a:t>16</a:t>
+            </a:fld>
+            <a:endParaRPr lang="en-US" dirty="0"/>
+          </a:p>
+        </p:txBody>
+      </p:sp>
+      <p:sp>
+        <p:nvSpPr>
+          <p:cNvPr id="7" name="Rectangle 6">
+            <a:extLst>
+              <a:ext uri="{FF2B5EF4-FFF2-40B4-BE49-F238E27FC236}">
+                <a16:creationId xmlns:a16="http://schemas.microsoft.com/office/drawing/2014/main" id="{C0CF9603-6D4E-41AD-9C36-E3B8CF77785D}"/>
+              </a:ext>
+            </a:extLst>
+          </p:cNvPr>
+          <p:cNvSpPr/>
+          <p:nvPr/>
+        </p:nvSpPr>
+        <p:spPr>
+          <a:xfrm>
+            <a:off x="380010" y="2159984"/>
+            <a:ext cx="8383980" cy="2538032"/>
+          </a:xfrm>
+          <a:prstGeom prst="rect">
+            <a:avLst/>
+          </a:prstGeom>
+        </p:spPr>
+        <p:style>
+          <a:lnRef idx="1">
+            <a:schemeClr val="accent2"/>
+          </a:lnRef>
+          <a:fillRef idx="2">
+            <a:schemeClr val="accent2"/>
+          </a:fillRef>
+          <a:effectRef idx="1">
+            <a:schemeClr val="accent2"/>
+          </a:effectRef>
+          <a:fontRef idx="minor">
+            <a:schemeClr val="dk1"/>
+          </a:fontRef>
+        </p:style>
+        <p:txBody>
+          <a:bodyPr rtlCol="0" anchor="ctr">
+            <a:normAutofit/>
+          </a:bodyPr>
+          <a:lstStyle/>
+          <a:p>
+            <a:pPr defTabSz="228600"/>
+            <a:r>
+              <a:rPr lang="en-US" sz="2000" b="1" dirty="0">
+                <a:latin typeface="+mj-lt"/>
+                <a:cs typeface="Courier New" panose="02070309020205020404" pitchFamily="49" charset="0"/>
+              </a:rPr>
+              <a:t>CREATE OR REPLACE VIEW </a:t>
+            </a:r>
+            <a:r>
+              <a:rPr lang="en-US" sz="2000" dirty="0" err="1">
+                <a:latin typeface="+mj-lt"/>
+                <a:cs typeface="Courier New" panose="02070309020205020404" pitchFamily="49" charset="0"/>
+              </a:rPr>
+              <a:t>high_salaries</a:t>
+            </a:r>
+            <a:r>
+              <a:rPr lang="en-US" sz="2000" dirty="0">
+                <a:latin typeface="+mj-lt"/>
+                <a:cs typeface="Courier New" panose="02070309020205020404" pitchFamily="49" charset="0"/>
+              </a:rPr>
+              <a:t> </a:t>
+            </a:r>
+            <a:r>
+              <a:rPr lang="en-US" sz="2000" b="1" dirty="0">
+                <a:latin typeface="+mj-lt"/>
+                <a:cs typeface="Courier New" panose="02070309020205020404" pitchFamily="49" charset="0"/>
+              </a:rPr>
+              <a:t>AS</a:t>
+            </a:r>
+          </a:p>
+          <a:p>
+            <a:pPr defTabSz="228600"/>
+            <a:r>
+              <a:rPr lang="en-US" sz="2000" b="1" dirty="0">
+                <a:latin typeface="+mj-lt"/>
+                <a:cs typeface="Courier New" panose="02070309020205020404" pitchFamily="49" charset="0"/>
+              </a:rPr>
+              <a:t>SELECT </a:t>
+            </a:r>
+            <a:r>
+              <a:rPr lang="en-US" sz="2000" dirty="0" err="1">
+                <a:latin typeface="+mj-lt"/>
+                <a:cs typeface="Courier New" panose="02070309020205020404" pitchFamily="49" charset="0"/>
+              </a:rPr>
+              <a:t>emp_name</a:t>
+            </a:r>
+            <a:r>
+              <a:rPr lang="en-US" sz="2000" dirty="0">
+                <a:latin typeface="+mj-lt"/>
+                <a:cs typeface="Courier New" panose="02070309020205020404" pitchFamily="49" charset="0"/>
+              </a:rPr>
+              <a:t>, </a:t>
+            </a:r>
+            <a:r>
+              <a:rPr lang="en-US" sz="2000" dirty="0" err="1">
+                <a:latin typeface="+mj-lt"/>
+                <a:cs typeface="Courier New" panose="02070309020205020404" pitchFamily="49" charset="0"/>
+              </a:rPr>
+              <a:t>emp_salary</a:t>
+            </a:r>
+            <a:r>
+              <a:rPr lang="en-US" sz="2000" dirty="0">
+                <a:latin typeface="+mj-lt"/>
+                <a:cs typeface="Courier New" panose="02070309020205020404" pitchFamily="49" charset="0"/>
+              </a:rPr>
+              <a:t> </a:t>
+            </a:r>
+            <a:r>
+              <a:rPr lang="en-US" sz="2000" b="1" dirty="0">
+                <a:latin typeface="+mj-lt"/>
+                <a:cs typeface="Courier New" panose="02070309020205020404" pitchFamily="49" charset="0"/>
+              </a:rPr>
+              <a:t>FROM </a:t>
+            </a:r>
+            <a:r>
+              <a:rPr lang="en-US" sz="2000" dirty="0" err="1">
+                <a:latin typeface="+mj-lt"/>
+                <a:cs typeface="Courier New" panose="02070309020205020404" pitchFamily="49" charset="0"/>
+              </a:rPr>
+              <a:t>examples.employees</a:t>
+            </a:r>
+            <a:r>
+              <a:rPr lang="en-US" sz="2000" dirty="0">
+                <a:latin typeface="+mj-lt"/>
+                <a:cs typeface="Courier New" panose="02070309020205020404" pitchFamily="49" charset="0"/>
+              </a:rPr>
+              <a:t> </a:t>
+            </a:r>
+          </a:p>
+          <a:p>
+            <a:pPr defTabSz="228600"/>
+            <a:r>
+              <a:rPr lang="en-US" sz="2000" b="1" dirty="0">
+                <a:latin typeface="+mj-lt"/>
+                <a:cs typeface="Courier New" panose="02070309020205020404" pitchFamily="49" charset="0"/>
+              </a:rPr>
+              <a:t>WHERE </a:t>
+            </a:r>
+            <a:r>
+              <a:rPr lang="en-US" sz="2000" dirty="0" err="1">
+                <a:latin typeface="+mj-lt"/>
+                <a:cs typeface="Courier New" panose="02070309020205020404" pitchFamily="49" charset="0"/>
+              </a:rPr>
+              <a:t>emp_salary</a:t>
+            </a:r>
+            <a:r>
+              <a:rPr lang="en-US" sz="2000" dirty="0">
+                <a:latin typeface="+mj-lt"/>
+                <a:cs typeface="Courier New" panose="02070309020205020404" pitchFamily="49" charset="0"/>
+              </a:rPr>
+              <a:t> </a:t>
+            </a:r>
+            <a:r>
+              <a:rPr lang="en-US" sz="2000" b="1" dirty="0">
+                <a:latin typeface="+mj-lt"/>
+                <a:cs typeface="Courier New" panose="02070309020205020404" pitchFamily="49" charset="0"/>
+              </a:rPr>
+              <a:t>&gt; </a:t>
+            </a:r>
+            <a:r>
+              <a:rPr lang="en-US" sz="2000" dirty="0">
+                <a:latin typeface="+mj-lt"/>
+                <a:cs typeface="Courier New" panose="02070309020205020404" pitchFamily="49" charset="0"/>
+              </a:rPr>
+              <a:t>(</a:t>
+            </a:r>
+            <a:r>
+              <a:rPr lang="en-US" sz="2000" b="1" dirty="0">
+                <a:latin typeface="+mj-lt"/>
+                <a:cs typeface="Courier New" panose="02070309020205020404" pitchFamily="49" charset="0"/>
+              </a:rPr>
+              <a:t>SELECT avg</a:t>
+            </a:r>
+            <a:r>
+              <a:rPr lang="en-US" sz="2000" dirty="0">
+                <a:latin typeface="+mj-lt"/>
+                <a:cs typeface="Courier New" panose="02070309020205020404" pitchFamily="49" charset="0"/>
+              </a:rPr>
+              <a:t>(</a:t>
+            </a:r>
+            <a:r>
+              <a:rPr lang="en-US" sz="2000" dirty="0" err="1">
+                <a:latin typeface="+mj-lt"/>
+                <a:cs typeface="Courier New" panose="02070309020205020404" pitchFamily="49" charset="0"/>
+              </a:rPr>
+              <a:t>emp_salary</a:t>
+            </a:r>
+            <a:r>
+              <a:rPr lang="en-US" sz="2000" dirty="0">
+                <a:latin typeface="+mj-lt"/>
+                <a:cs typeface="Courier New" panose="02070309020205020404" pitchFamily="49" charset="0"/>
+              </a:rPr>
+              <a:t>)</a:t>
+            </a:r>
+            <a:r>
+              <a:rPr lang="en-US" sz="2000" b="1" dirty="0">
+                <a:latin typeface="+mj-lt"/>
+                <a:cs typeface="Courier New" panose="02070309020205020404" pitchFamily="49" charset="0"/>
+              </a:rPr>
+              <a:t> FROM </a:t>
+            </a:r>
+            <a:r>
+              <a:rPr lang="en-US" sz="2000" dirty="0" err="1">
+                <a:latin typeface="+mj-lt"/>
+                <a:cs typeface="Courier New" panose="02070309020205020404" pitchFamily="49" charset="0"/>
+              </a:rPr>
+              <a:t>examples.employees</a:t>
+            </a:r>
+            <a:r>
+              <a:rPr lang="en-US" sz="2000" dirty="0">
+                <a:latin typeface="+mj-lt"/>
+                <a:cs typeface="Courier New" panose="02070309020205020404" pitchFamily="49" charset="0"/>
+              </a:rPr>
+              <a:t>);</a:t>
+            </a:r>
+          </a:p>
+          <a:p>
+            <a:pPr defTabSz="228600"/>
+            <a:endParaRPr lang="en-US" sz="2000" b="1" dirty="0">
+              <a:latin typeface="+mj-lt"/>
+              <a:cs typeface="Courier New" panose="02070309020205020404" pitchFamily="49" charset="0"/>
+            </a:endParaRPr>
+          </a:p>
+          <a:p>
+            <a:pPr defTabSz="228600"/>
+            <a:r>
+              <a:rPr lang="en-US" sz="2000" b="1" dirty="0">
+                <a:latin typeface="+mj-lt"/>
+                <a:cs typeface="Courier New" panose="02070309020205020404" pitchFamily="49" charset="0"/>
+              </a:rPr>
+              <a:t>SELECT </a:t>
+            </a:r>
+            <a:r>
+              <a:rPr lang="en-US" sz="2000" dirty="0">
+                <a:latin typeface="+mj-lt"/>
+                <a:cs typeface="Courier New" panose="02070309020205020404" pitchFamily="49" charset="0"/>
+              </a:rPr>
+              <a:t>*</a:t>
+            </a:r>
+            <a:r>
+              <a:rPr lang="en-US" sz="2000" b="1" dirty="0">
+                <a:latin typeface="+mj-lt"/>
+                <a:cs typeface="Courier New" panose="02070309020205020404" pitchFamily="49" charset="0"/>
+              </a:rPr>
+              <a:t> FROM </a:t>
+            </a:r>
+            <a:r>
+              <a:rPr lang="en-US" sz="2000" dirty="0" err="1">
+                <a:latin typeface="+mj-lt"/>
+                <a:cs typeface="Courier New" panose="02070309020205020404" pitchFamily="49" charset="0"/>
+              </a:rPr>
+              <a:t>high_salaries</a:t>
+            </a:r>
+            <a:r>
+              <a:rPr lang="en-US" sz="2000" dirty="0">
+                <a:latin typeface="+mj-lt"/>
+                <a:cs typeface="Courier New" panose="02070309020205020404" pitchFamily="49" charset="0"/>
+              </a:rPr>
+              <a:t>;</a:t>
+            </a:r>
+          </a:p>
+        </p:txBody>
+      </p:sp>
+    </p:spTree>
+    <p:extLst>
+      <p:ext uri="{BB962C8B-B14F-4D97-AF65-F5344CB8AC3E}">
+        <p14:creationId xmlns:p14="http://schemas.microsoft.com/office/powerpoint/2010/main" val="1967142855"/>
+      </p:ext>
+    </p:extLst>
+  </p:cSld>
+  <p:clrMapOvr>
+    <a:masterClrMapping/>
+  </p:clrMapOvr>
+</p:sld>
+</file>
+
+<file path=ppt/slides/slide18.xml><?xml version="1.0" encoding="utf-8"?>
 <p:sld xmlns:a="http://schemas.openxmlformats.org/drawingml/2006/main" xmlns:r="http://schemas.openxmlformats.org/officeDocument/2006/relationships" xmlns:p="http://schemas.openxmlformats.org/presentationml/2006/main">
   <p:cSld>
     <p:spTree>
@@ -40064,7 +40929,7 @@
             <a:fld id="{F6728BC2-ACA3-447C-A909-F3F49211C066}" type="slidenum">
               <a:rPr lang="en-US" smtClean="0"/>
               <a:pPr/>
-              <a:t>15</a:t>
+              <a:t>17</a:t>
             </a:fld>
             <a:endParaRPr lang="en-US" dirty="0"/>
           </a:p>
@@ -40258,12 +41123,16 @@
               <a:t>UPDATE </a:t>
             </a:r>
             <a:r>
-              <a:rPr lang="en-US" sz="2000" dirty="0">
+              <a:rPr lang="en-US" sz="2000" dirty="0" err="1">
                 <a:latin typeface="+mj-lt"/>
                 <a:cs typeface="Courier New" panose="02070309020205020404" pitchFamily="49" charset="0"/>
               </a:rPr>
-              <a:t>employees</a:t>
+              <a:t>example.employees</a:t>
             </a:r>
+            <a:endParaRPr lang="en-US" sz="2000" dirty="0">
+              <a:latin typeface="+mj-lt"/>
+              <a:cs typeface="Courier New" panose="02070309020205020404" pitchFamily="49" charset="0"/>
+            </a:endParaRPr>
           </a:p>
           <a:p>
             <a:pPr defTabSz="228600"/>
@@ -40286,7 +41155,7 @@
                 <a:latin typeface="+mj-lt"/>
                 <a:cs typeface="Courier New" panose="02070309020205020404" pitchFamily="49" charset="0"/>
               </a:rPr>
-              <a:t>sal</a:t>
+              <a:t>emp_salary</a:t>
             </a:r>
             <a:r>
               <a:rPr lang="en-US" sz="2000" dirty="0">
@@ -40320,11 +41189,18 @@
               <a:t>	WHERE </a:t>
             </a:r>
             <a:r>
+              <a:rPr lang="en-US" sz="2000" dirty="0" err="1">
+                <a:latin typeface="+mj-lt"/>
+                <a:cs typeface="Courier New" panose="02070309020205020404" pitchFamily="49" charset="0"/>
+              </a:rPr>
+              <a:t>emp_id</a:t>
+            </a:r>
+            <a:r>
               <a:rPr lang="en-US" sz="2000" dirty="0">
                 <a:latin typeface="+mj-lt"/>
                 <a:cs typeface="Courier New" panose="02070309020205020404" pitchFamily="49" charset="0"/>
               </a:rPr>
-              <a:t>id = </a:t>
+              <a:t> = </a:t>
             </a:r>
             <a:r>
               <a:rPr lang="en-US" sz="2000" dirty="0" err="1">
@@ -40387,7 +41263,7 @@
 </p:sld>
 </file>
 
-<file path=ppt/slides/slide17.xml><?xml version="1.0" encoding="utf-8"?>
+<file path=ppt/slides/slide19.xml><?xml version="1.0" encoding="utf-8"?>
 <p:sld xmlns:a="http://schemas.openxmlformats.org/drawingml/2006/main" xmlns:r="http://schemas.openxmlformats.org/officeDocument/2006/relationships" xmlns:p="http://schemas.openxmlformats.org/presentationml/2006/main">
   <p:cSld>
     <p:spTree>
@@ -40491,7 +41367,7 @@
             </a:pPr>
             <a:fld id="{00000000-1234-1234-1234-123412341234}" type="slidenum">
               <a:rPr lang="en-US"/>
-              <a:t>16</a:t>
+              <a:t>18</a:t>
             </a:fld>
             <a:endParaRPr/>
           </a:p>

</xml_diff>

<commit_message>
Adding final SQL practice script files
</commit_message>
<xml_diff>
--- a/powerpoints/Day_22.pptx
+++ b/powerpoints/Day_22.pptx
@@ -23,9 +23,9 @@
     <p:sldId id="321" r:id="rId14"/>
     <p:sldId id="306" r:id="rId15"/>
     <p:sldId id="314" r:id="rId16"/>
-    <p:sldId id="318" r:id="rId17"/>
-    <p:sldId id="320" r:id="rId18"/>
-    <p:sldId id="319" r:id="rId19"/>
+    <p:sldId id="319" r:id="rId17"/>
+    <p:sldId id="318" r:id="rId18"/>
+    <p:sldId id="320" r:id="rId19"/>
     <p:sldId id="270" r:id="rId20"/>
   </p:sldIdLst>
   <p:sldSz cx="9144000" cy="6858000" type="screen4x3"/>
@@ -349,7 +349,7 @@
           <a:p>
             <a:fld id="{444FBF54-D46F-48F7-AC61-EED38DB2F72A}" type="datetimeFigureOut">
               <a:rPr lang="en-US" smtClean="0"/>
-              <a:t>10/13/2021</a:t>
+              <a:t>10/15/2021</a:t>
             </a:fld>
             <a:endParaRPr lang="en-US"/>
           </a:p>
@@ -39764,7 +39764,7 @@
                 <a:latin typeface="+mj-lt"/>
                 <a:cs typeface="Courier New" panose="02070309020205020404" pitchFamily="49" charset="0"/>
               </a:rPr>
-              <a:t>EXECUTE </a:t>
+              <a:t>EXECUTE FUNCTION </a:t>
             </a:r>
             <a:r>
               <a:rPr lang="en-US" sz="2000" dirty="0" err="1">
@@ -39878,7 +39878,7 @@
                 <a:latin typeface="+mj-lt"/>
                 <a:cs typeface="Courier New" panose="02070309020205020404" pitchFamily="49" charset="0"/>
               </a:rPr>
-              <a:t>EXECUTE </a:t>
+              <a:t>EXECUTE FUNCTION </a:t>
             </a:r>
             <a:r>
               <a:rPr lang="en-US" sz="2000" dirty="0" err="1">
@@ -39918,6 +39918,477 @@
 </file>
 
 <file path=ppt/slides/slide16.xml><?xml version="1.0" encoding="utf-8"?>
+<p:sld xmlns:a="http://schemas.openxmlformats.org/drawingml/2006/main" xmlns:r="http://schemas.openxmlformats.org/officeDocument/2006/relationships" xmlns:p="http://schemas.openxmlformats.org/presentationml/2006/main">
+  <p:cSld>
+    <p:spTree>
+      <p:nvGrpSpPr>
+        <p:cNvPr id="1" name=""/>
+        <p:cNvGrpSpPr/>
+        <p:nvPr/>
+      </p:nvGrpSpPr>
+      <p:grpSpPr>
+        <a:xfrm>
+          <a:off x="0" y="0"/>
+          <a:ext cx="0" cy="0"/>
+          <a:chOff x="0" y="0"/>
+          <a:chExt cx="0" cy="0"/>
+        </a:xfrm>
+      </p:grpSpPr>
+      <p:sp>
+        <p:nvSpPr>
+          <p:cNvPr id="2" name="Title 1">
+            <a:extLst>
+              <a:ext uri="{FF2B5EF4-FFF2-40B4-BE49-F238E27FC236}">
+                <a16:creationId xmlns:a16="http://schemas.microsoft.com/office/drawing/2014/main" id="{CF632BDC-60C6-42B2-9A05-7C70219C6135}"/>
+              </a:ext>
+            </a:extLst>
+          </p:cNvPr>
+          <p:cNvSpPr>
+            <a:spLocks noGrp="1"/>
+          </p:cNvSpPr>
+          <p:nvPr>
+            <p:ph type="title"/>
+          </p:nvPr>
+        </p:nvSpPr>
+        <p:spPr/>
+        <p:txBody>
+          <a:bodyPr/>
+          <a:lstStyle/>
+          <a:p>
+            <a:r>
+              <a:rPr lang="en-US" dirty="0"/>
+              <a:t>Stored Procedure</a:t>
+            </a:r>
+          </a:p>
+        </p:txBody>
+      </p:sp>
+      <p:sp>
+        <p:nvSpPr>
+          <p:cNvPr id="3" name="Content Placeholder 2">
+            <a:extLst>
+              <a:ext uri="{FF2B5EF4-FFF2-40B4-BE49-F238E27FC236}">
+                <a16:creationId xmlns:a16="http://schemas.microsoft.com/office/drawing/2014/main" id="{6D039C8B-8CCD-4451-9AD7-E92E3A860EEB}"/>
+              </a:ext>
+            </a:extLst>
+          </p:cNvPr>
+          <p:cNvSpPr>
+            <a:spLocks noGrp="1"/>
+          </p:cNvSpPr>
+          <p:nvPr>
+            <p:ph idx="1"/>
+          </p:nvPr>
+        </p:nvSpPr>
+        <p:spPr>
+          <a:xfrm>
+            <a:off x="380010" y="1481447"/>
+            <a:ext cx="8383980" cy="2526796"/>
+          </a:xfrm>
+        </p:spPr>
+        <p:txBody>
+          <a:bodyPr>
+            <a:normAutofit fontScale="85000" lnSpcReduction="20000"/>
+          </a:bodyPr>
+          <a:lstStyle/>
+          <a:p>
+            <a:r>
+              <a:rPr lang="en-US" dirty="0">
+                <a:hlinkClick r:id="rId2"/>
+              </a:rPr>
+              <a:t>https://www.postgresqltutorial.com/postgresql-create-procedure/</a:t>
+            </a:r>
+            <a:endParaRPr lang="en-US" dirty="0"/>
+          </a:p>
+          <a:p>
+            <a:r>
+              <a:rPr lang="en-US" dirty="0"/>
+              <a:t>Do not return a value </a:t>
+            </a:r>
+          </a:p>
+          <a:p>
+            <a:r>
+              <a:rPr lang="en-US" dirty="0"/>
+              <a:t>Take in some input </a:t>
+            </a:r>
+          </a:p>
+          <a:p>
+            <a:r>
+              <a:rPr lang="en-US" dirty="0"/>
+              <a:t>Perform some transaction or set of transactions</a:t>
+            </a:r>
+          </a:p>
+          <a:p>
+            <a:r>
+              <a:rPr lang="en-US" dirty="0"/>
+              <a:t>Executed using the CALL command– </a:t>
+            </a:r>
+          </a:p>
+          <a:p>
+            <a:r>
+              <a:rPr lang="en-US" dirty="0"/>
+              <a:t>CALL </a:t>
+            </a:r>
+            <a:r>
+              <a:rPr lang="en-US" dirty="0" err="1"/>
+              <a:t>stored_proc_name</a:t>
+            </a:r>
+            <a:r>
+              <a:rPr lang="en-US" dirty="0"/>
+              <a:t>(</a:t>
+            </a:r>
+            <a:r>
+              <a:rPr lang="en-US" dirty="0" err="1"/>
+              <a:t>argument_list</a:t>
+            </a:r>
+            <a:r>
+              <a:rPr lang="en-US" dirty="0"/>
+              <a:t>); </a:t>
+            </a:r>
+          </a:p>
+          <a:p>
+            <a:pPr marL="0" indent="0">
+              <a:buNone/>
+            </a:pPr>
+            <a:endParaRPr lang="en-US" dirty="0"/>
+          </a:p>
+          <a:p>
+            <a:endParaRPr lang="en-US" dirty="0"/>
+          </a:p>
+          <a:p>
+            <a:endParaRPr lang="en-US" dirty="0"/>
+          </a:p>
+        </p:txBody>
+      </p:sp>
+      <p:sp>
+        <p:nvSpPr>
+          <p:cNvPr id="4" name="Slide Number Placeholder 3">
+            <a:extLst>
+              <a:ext uri="{FF2B5EF4-FFF2-40B4-BE49-F238E27FC236}">
+                <a16:creationId xmlns:a16="http://schemas.microsoft.com/office/drawing/2014/main" id="{481F7F5B-54DF-4CD2-A6C1-142EAD34FCFF}"/>
+              </a:ext>
+            </a:extLst>
+          </p:cNvPr>
+          <p:cNvSpPr>
+            <a:spLocks noGrp="1"/>
+          </p:cNvSpPr>
+          <p:nvPr>
+            <p:ph type="sldNum" sz="quarter" idx="12"/>
+          </p:nvPr>
+        </p:nvSpPr>
+        <p:spPr/>
+        <p:txBody>
+          <a:bodyPr/>
+          <a:lstStyle/>
+          <a:p>
+            <a:fld id="{F6728BC2-ACA3-447C-A909-F3F49211C066}" type="slidenum">
+              <a:rPr lang="en-US" smtClean="0"/>
+              <a:pPr/>
+              <a:t>15</a:t>
+            </a:fld>
+            <a:endParaRPr lang="en-US" dirty="0"/>
+          </a:p>
+        </p:txBody>
+      </p:sp>
+      <p:sp>
+        <p:nvSpPr>
+          <p:cNvPr id="6" name="Rectangle 5">
+            <a:extLst>
+              <a:ext uri="{FF2B5EF4-FFF2-40B4-BE49-F238E27FC236}">
+                <a16:creationId xmlns:a16="http://schemas.microsoft.com/office/drawing/2014/main" id="{1DCCAFDA-05E8-42C6-AD76-6D65D75E8DA5}"/>
+              </a:ext>
+            </a:extLst>
+          </p:cNvPr>
+          <p:cNvSpPr/>
+          <p:nvPr/>
+        </p:nvSpPr>
+        <p:spPr>
+          <a:xfrm>
+            <a:off x="455511" y="4008242"/>
+            <a:ext cx="8383980" cy="2538032"/>
+          </a:xfrm>
+          <a:prstGeom prst="rect">
+            <a:avLst/>
+          </a:prstGeom>
+        </p:spPr>
+        <p:style>
+          <a:lnRef idx="1">
+            <a:schemeClr val="accent2"/>
+          </a:lnRef>
+          <a:fillRef idx="2">
+            <a:schemeClr val="accent2"/>
+          </a:fillRef>
+          <a:effectRef idx="1">
+            <a:schemeClr val="accent2"/>
+          </a:effectRef>
+          <a:fontRef idx="minor">
+            <a:schemeClr val="dk1"/>
+          </a:fontRef>
+        </p:style>
+        <p:txBody>
+          <a:bodyPr rtlCol="0" anchor="ctr">
+            <a:normAutofit fontScale="92500" lnSpcReduction="20000"/>
+          </a:bodyPr>
+          <a:lstStyle/>
+          <a:p>
+            <a:pPr defTabSz="228600"/>
+            <a:r>
+              <a:rPr lang="en-US" sz="2000" b="1" dirty="0">
+                <a:latin typeface="+mj-lt"/>
+                <a:cs typeface="Courier New" panose="02070309020205020404" pitchFamily="49" charset="0"/>
+              </a:rPr>
+              <a:t>CREATE OR REPLACE PROCEDURE </a:t>
+            </a:r>
+            <a:r>
+              <a:rPr lang="en-US" sz="2000" dirty="0" err="1">
+                <a:latin typeface="+mj-lt"/>
+                <a:cs typeface="Courier New" panose="02070309020205020404" pitchFamily="49" charset="0"/>
+              </a:rPr>
+              <a:t>percentage_raise</a:t>
+            </a:r>
+            <a:r>
+              <a:rPr lang="en-US" sz="2000" dirty="0">
+                <a:latin typeface="+mj-lt"/>
+                <a:cs typeface="Courier New" panose="02070309020205020404" pitchFamily="49" charset="0"/>
+              </a:rPr>
+              <a:t>(increase </a:t>
+            </a:r>
+            <a:r>
+              <a:rPr lang="en-US" sz="2000" b="1" dirty="0">
+                <a:latin typeface="+mj-lt"/>
+                <a:cs typeface="Courier New" panose="02070309020205020404" pitchFamily="49" charset="0"/>
+              </a:rPr>
+              <a:t>DEC, </a:t>
+            </a:r>
+            <a:r>
+              <a:rPr lang="en-US" sz="2000" dirty="0" err="1">
+                <a:latin typeface="+mj-lt"/>
+                <a:cs typeface="Courier New" panose="02070309020205020404" pitchFamily="49" charset="0"/>
+              </a:rPr>
+              <a:t>employee_id</a:t>
+            </a:r>
+            <a:r>
+              <a:rPr lang="en-US" sz="2000" dirty="0">
+                <a:latin typeface="+mj-lt"/>
+                <a:cs typeface="Courier New" panose="02070309020205020404" pitchFamily="49" charset="0"/>
+              </a:rPr>
+              <a:t> </a:t>
+            </a:r>
+            <a:r>
+              <a:rPr lang="en-US" sz="2000" b="1" dirty="0">
+                <a:latin typeface="+mj-lt"/>
+                <a:cs typeface="Courier New" panose="02070309020205020404" pitchFamily="49" charset="0"/>
+              </a:rPr>
+              <a:t>INT</a:t>
+            </a:r>
+            <a:r>
+              <a:rPr lang="en-US" sz="2000" dirty="0">
+                <a:latin typeface="+mj-lt"/>
+                <a:cs typeface="Courier New" panose="02070309020205020404" pitchFamily="49" charset="0"/>
+              </a:rPr>
+              <a:t>)</a:t>
+            </a:r>
+          </a:p>
+          <a:p>
+            <a:pPr defTabSz="228600"/>
+            <a:r>
+              <a:rPr lang="en-US" sz="2000" b="1" dirty="0">
+                <a:latin typeface="+mj-lt"/>
+                <a:cs typeface="Courier New" panose="02070309020205020404" pitchFamily="49" charset="0"/>
+              </a:rPr>
+              <a:t>LANGUAGE </a:t>
+            </a:r>
+            <a:r>
+              <a:rPr lang="en-US" sz="2000" dirty="0" err="1">
+                <a:latin typeface="+mj-lt"/>
+                <a:cs typeface="Courier New" panose="02070309020205020404" pitchFamily="49" charset="0"/>
+              </a:rPr>
+              <a:t>plpgsql</a:t>
+            </a:r>
+            <a:r>
+              <a:rPr lang="en-US" sz="2000" dirty="0">
+                <a:latin typeface="+mj-lt"/>
+                <a:cs typeface="Courier New" panose="02070309020205020404" pitchFamily="49" charset="0"/>
+              </a:rPr>
+              <a:t>	</a:t>
+            </a:r>
+          </a:p>
+          <a:p>
+            <a:pPr defTabSz="228600"/>
+            <a:r>
+              <a:rPr lang="en-US" sz="2000" b="1" dirty="0">
+                <a:latin typeface="+mj-lt"/>
+                <a:cs typeface="Courier New" panose="02070309020205020404" pitchFamily="49" charset="0"/>
+              </a:rPr>
+              <a:t>AS $$</a:t>
+            </a:r>
+          </a:p>
+          <a:p>
+            <a:pPr defTabSz="228600"/>
+            <a:r>
+              <a:rPr lang="en-US" sz="2000" b="1" dirty="0">
+                <a:latin typeface="+mj-lt"/>
+                <a:cs typeface="Courier New" panose="02070309020205020404" pitchFamily="49" charset="0"/>
+              </a:rPr>
+              <a:t>BEGIN</a:t>
+            </a:r>
+          </a:p>
+          <a:p>
+            <a:pPr defTabSz="228600"/>
+            <a:r>
+              <a:rPr lang="en-US" sz="2000" dirty="0">
+                <a:latin typeface="+mj-lt"/>
+                <a:cs typeface="Courier New" panose="02070309020205020404" pitchFamily="49" charset="0"/>
+              </a:rPr>
+              <a:t>	</a:t>
+            </a:r>
+            <a:r>
+              <a:rPr lang="en-US" sz="2000" b="1" dirty="0">
+                <a:latin typeface="+mj-lt"/>
+                <a:cs typeface="Courier New" panose="02070309020205020404" pitchFamily="49" charset="0"/>
+              </a:rPr>
+              <a:t>UPDATE </a:t>
+            </a:r>
+            <a:r>
+              <a:rPr lang="en-US" sz="2000" dirty="0" err="1">
+                <a:latin typeface="+mj-lt"/>
+                <a:cs typeface="Courier New" panose="02070309020205020404" pitchFamily="49" charset="0"/>
+              </a:rPr>
+              <a:t>example.employees</a:t>
+            </a:r>
+            <a:endParaRPr lang="en-US" sz="2000" dirty="0">
+              <a:latin typeface="+mj-lt"/>
+              <a:cs typeface="Courier New" panose="02070309020205020404" pitchFamily="49" charset="0"/>
+            </a:endParaRPr>
+          </a:p>
+          <a:p>
+            <a:pPr defTabSz="228600"/>
+            <a:r>
+              <a:rPr lang="en-US" sz="2000" dirty="0">
+                <a:latin typeface="+mj-lt"/>
+                <a:cs typeface="Courier New" panose="02070309020205020404" pitchFamily="49" charset="0"/>
+              </a:rPr>
+              <a:t>	</a:t>
+            </a:r>
+            <a:r>
+              <a:rPr lang="en-US" sz="2000" b="1" dirty="0">
+                <a:latin typeface="+mj-lt"/>
+                <a:cs typeface="Courier New" panose="02070309020205020404" pitchFamily="49" charset="0"/>
+              </a:rPr>
+              <a:t>SET </a:t>
+            </a:r>
+            <a:r>
+              <a:rPr lang="en-US" sz="2000" dirty="0" err="1">
+                <a:latin typeface="+mj-lt"/>
+                <a:cs typeface="Courier New" panose="02070309020205020404" pitchFamily="49" charset="0"/>
+              </a:rPr>
+              <a:t>emp_salary</a:t>
+            </a:r>
+            <a:r>
+              <a:rPr lang="en-US" sz="2000" dirty="0">
+                <a:latin typeface="+mj-lt"/>
+                <a:cs typeface="Courier New" panose="02070309020205020404" pitchFamily="49" charset="0"/>
+              </a:rPr>
+              <a:t> = </a:t>
+            </a:r>
+            <a:r>
+              <a:rPr lang="en-US" sz="2000" dirty="0" err="1">
+                <a:latin typeface="+mj-lt"/>
+                <a:cs typeface="Courier New" panose="02070309020205020404" pitchFamily="49" charset="0"/>
+              </a:rPr>
+              <a:t>emp_salary</a:t>
+            </a:r>
+            <a:r>
+              <a:rPr lang="en-US" sz="2000" dirty="0">
+                <a:latin typeface="+mj-lt"/>
+                <a:cs typeface="Courier New" panose="02070309020205020404" pitchFamily="49" charset="0"/>
+              </a:rPr>
+              <a:t> * increase</a:t>
+            </a:r>
+          </a:p>
+          <a:p>
+            <a:pPr defTabSz="228600"/>
+            <a:r>
+              <a:rPr lang="en-US" sz="2000" b="1" dirty="0">
+                <a:latin typeface="+mj-lt"/>
+                <a:cs typeface="Courier New" panose="02070309020205020404" pitchFamily="49" charset="0"/>
+              </a:rPr>
+              <a:t>	WHERE </a:t>
+            </a:r>
+            <a:r>
+              <a:rPr lang="en-US" sz="2000" dirty="0" err="1">
+                <a:latin typeface="+mj-lt"/>
+                <a:cs typeface="Courier New" panose="02070309020205020404" pitchFamily="49" charset="0"/>
+              </a:rPr>
+              <a:t>emp_id</a:t>
+            </a:r>
+            <a:r>
+              <a:rPr lang="en-US" sz="2000" dirty="0">
+                <a:latin typeface="+mj-lt"/>
+                <a:cs typeface="Courier New" panose="02070309020205020404" pitchFamily="49" charset="0"/>
+              </a:rPr>
+              <a:t> = </a:t>
+            </a:r>
+            <a:r>
+              <a:rPr lang="en-US" sz="2000" dirty="0" err="1">
+                <a:latin typeface="+mj-lt"/>
+                <a:cs typeface="Courier New" panose="02070309020205020404" pitchFamily="49" charset="0"/>
+              </a:rPr>
+              <a:t>employee_id</a:t>
+            </a:r>
+            <a:r>
+              <a:rPr lang="en-US" sz="2000" dirty="0">
+                <a:latin typeface="+mj-lt"/>
+                <a:cs typeface="Courier New" panose="02070309020205020404" pitchFamily="49" charset="0"/>
+              </a:rPr>
+              <a:t>;  </a:t>
+            </a:r>
+          </a:p>
+          <a:p>
+            <a:pPr defTabSz="228600"/>
+            <a:r>
+              <a:rPr lang="en-US" sz="2000" b="1" dirty="0">
+                <a:latin typeface="+mj-lt"/>
+                <a:cs typeface="Courier New" panose="02070309020205020404" pitchFamily="49" charset="0"/>
+              </a:rPr>
+              <a:t>COMMIT</a:t>
+            </a:r>
+            <a:r>
+              <a:rPr lang="en-US" sz="2000" dirty="0">
+                <a:latin typeface="+mj-lt"/>
+                <a:cs typeface="Courier New" panose="02070309020205020404" pitchFamily="49" charset="0"/>
+              </a:rPr>
+              <a:t>;</a:t>
+            </a:r>
+          </a:p>
+          <a:p>
+            <a:pPr defTabSz="228600"/>
+            <a:r>
+              <a:rPr lang="en-US" sz="2000" b="1" dirty="0">
+                <a:latin typeface="+mj-lt"/>
+                <a:cs typeface="Courier New" panose="02070309020205020404" pitchFamily="49" charset="0"/>
+              </a:rPr>
+              <a:t>END; $$</a:t>
+            </a:r>
+            <a:endParaRPr lang="en-US" sz="2000" dirty="0">
+              <a:latin typeface="+mj-lt"/>
+              <a:cs typeface="Courier New" panose="02070309020205020404" pitchFamily="49" charset="0"/>
+            </a:endParaRPr>
+          </a:p>
+        </p:txBody>
+      </p:sp>
+    </p:spTree>
+    <p:extLst>
+      <p:ext uri="{BB962C8B-B14F-4D97-AF65-F5344CB8AC3E}">
+        <p14:creationId xmlns:p14="http://schemas.microsoft.com/office/powerpoint/2010/main" val="900233692"/>
+      </p:ext>
+    </p:extLst>
+  </p:cSld>
+  <p:clrMapOvr>
+    <a:masterClrMapping/>
+  </p:clrMapOvr>
+</p:sld>
+</file>
+
+<file path=ppt/slides/slide17.xml><?xml version="1.0" encoding="utf-8"?>
 <p:sld xmlns:a="http://schemas.openxmlformats.org/drawingml/2006/main" xmlns:r="http://schemas.openxmlformats.org/officeDocument/2006/relationships" xmlns:p="http://schemas.openxmlformats.org/presentationml/2006/main">
   <p:cSld>
     <p:spTree>
@@ -40066,7 +40537,7 @@
             <a:fld id="{F6728BC2-ACA3-447C-A909-F3F49211C066}" type="slidenum">
               <a:rPr lang="en-US" smtClean="0"/>
               <a:pPr/>
-              <a:t>15</a:t>
+              <a:t>16</a:t>
             </a:fld>
             <a:endParaRPr lang="en-US" dirty="0"/>
           </a:p>
@@ -40412,7 +40883,7 @@
 </p:sld>
 </file>
 
-<file path=ppt/slides/slide17.xml><?xml version="1.0" encoding="utf-8"?>
+<file path=ppt/slides/slide18.xml><?xml version="1.0" encoding="utf-8"?>
 <p:sld xmlns:a="http://schemas.openxmlformats.org/drawingml/2006/main" xmlns:r="http://schemas.openxmlformats.org/officeDocument/2006/relationships" xmlns:p="http://schemas.openxmlformats.org/presentationml/2006/main">
   <p:cSld>
     <p:spTree>
@@ -40481,7 +40952,7 @@
             <a:fld id="{F6728BC2-ACA3-447C-A909-F3F49211C066}" type="slidenum">
               <a:rPr lang="en-US" smtClean="0"/>
               <a:pPr/>
-              <a:t>16</a:t>
+              <a:t>17</a:t>
             </a:fld>
             <a:endParaRPr lang="en-US" dirty="0"/>
           </a:p>
@@ -40755,505 +41226,6 @@
     <p:extLst>
       <p:ext uri="{BB962C8B-B14F-4D97-AF65-F5344CB8AC3E}">
         <p14:creationId xmlns:p14="http://schemas.microsoft.com/office/powerpoint/2010/main" val="1967142855"/>
-      </p:ext>
-    </p:extLst>
-  </p:cSld>
-  <p:clrMapOvr>
-    <a:masterClrMapping/>
-  </p:clrMapOvr>
-</p:sld>
-</file>
-
-<file path=ppt/slides/slide18.xml><?xml version="1.0" encoding="utf-8"?>
-<p:sld xmlns:a="http://schemas.openxmlformats.org/drawingml/2006/main" xmlns:r="http://schemas.openxmlformats.org/officeDocument/2006/relationships" xmlns:p="http://schemas.openxmlformats.org/presentationml/2006/main">
-  <p:cSld>
-    <p:spTree>
-      <p:nvGrpSpPr>
-        <p:cNvPr id="1" name=""/>
-        <p:cNvGrpSpPr/>
-        <p:nvPr/>
-      </p:nvGrpSpPr>
-      <p:grpSpPr>
-        <a:xfrm>
-          <a:off x="0" y="0"/>
-          <a:ext cx="0" cy="0"/>
-          <a:chOff x="0" y="0"/>
-          <a:chExt cx="0" cy="0"/>
-        </a:xfrm>
-      </p:grpSpPr>
-      <p:sp>
-        <p:nvSpPr>
-          <p:cNvPr id="2" name="Title 1">
-            <a:extLst>
-              <a:ext uri="{FF2B5EF4-FFF2-40B4-BE49-F238E27FC236}">
-                <a16:creationId xmlns:a16="http://schemas.microsoft.com/office/drawing/2014/main" id="{CF632BDC-60C6-42B2-9A05-7C70219C6135}"/>
-              </a:ext>
-            </a:extLst>
-          </p:cNvPr>
-          <p:cNvSpPr>
-            <a:spLocks noGrp="1"/>
-          </p:cNvSpPr>
-          <p:nvPr>
-            <p:ph type="title"/>
-          </p:nvPr>
-        </p:nvSpPr>
-        <p:spPr/>
-        <p:txBody>
-          <a:bodyPr/>
-          <a:lstStyle/>
-          <a:p>
-            <a:r>
-              <a:rPr lang="en-US" dirty="0"/>
-              <a:t>Stored Procedure</a:t>
-            </a:r>
-          </a:p>
-        </p:txBody>
-      </p:sp>
-      <p:sp>
-        <p:nvSpPr>
-          <p:cNvPr id="3" name="Content Placeholder 2">
-            <a:extLst>
-              <a:ext uri="{FF2B5EF4-FFF2-40B4-BE49-F238E27FC236}">
-                <a16:creationId xmlns:a16="http://schemas.microsoft.com/office/drawing/2014/main" id="{6D039C8B-8CCD-4451-9AD7-E92E3A860EEB}"/>
-              </a:ext>
-            </a:extLst>
-          </p:cNvPr>
-          <p:cNvSpPr>
-            <a:spLocks noGrp="1"/>
-          </p:cNvSpPr>
-          <p:nvPr>
-            <p:ph idx="1"/>
-          </p:nvPr>
-        </p:nvSpPr>
-        <p:spPr>
-          <a:xfrm>
-            <a:off x="380010" y="1481447"/>
-            <a:ext cx="8383980" cy="2526796"/>
-          </a:xfrm>
-        </p:spPr>
-        <p:txBody>
-          <a:bodyPr>
-            <a:normAutofit fontScale="85000" lnSpcReduction="20000"/>
-          </a:bodyPr>
-          <a:lstStyle/>
-          <a:p>
-            <a:r>
-              <a:rPr lang="en-US" dirty="0">
-                <a:hlinkClick r:id="rId2"/>
-              </a:rPr>
-              <a:t>https://www.postgresqltutorial.com/postgresql-create-procedure/</a:t>
-            </a:r>
-            <a:endParaRPr lang="en-US" dirty="0"/>
-          </a:p>
-          <a:p>
-            <a:r>
-              <a:rPr lang="en-US" dirty="0"/>
-              <a:t>Do not return a value </a:t>
-            </a:r>
-          </a:p>
-          <a:p>
-            <a:r>
-              <a:rPr lang="en-US" dirty="0"/>
-              <a:t>Take in some input </a:t>
-            </a:r>
-          </a:p>
-          <a:p>
-            <a:r>
-              <a:rPr lang="en-US" dirty="0"/>
-              <a:t>Perform some transaction or set of transactions</a:t>
-            </a:r>
-          </a:p>
-          <a:p>
-            <a:r>
-              <a:rPr lang="en-US" dirty="0"/>
-              <a:t>Executed using the CALL command– </a:t>
-            </a:r>
-          </a:p>
-          <a:p>
-            <a:r>
-              <a:rPr lang="en-US" dirty="0"/>
-              <a:t>CALL </a:t>
-            </a:r>
-            <a:r>
-              <a:rPr lang="en-US" dirty="0" err="1"/>
-              <a:t>stored_proc_name</a:t>
-            </a:r>
-            <a:r>
-              <a:rPr lang="en-US" dirty="0"/>
-              <a:t>(</a:t>
-            </a:r>
-            <a:r>
-              <a:rPr lang="en-US" dirty="0" err="1"/>
-              <a:t>argument_list</a:t>
-            </a:r>
-            <a:r>
-              <a:rPr lang="en-US" dirty="0"/>
-              <a:t>); </a:t>
-            </a:r>
-          </a:p>
-          <a:p>
-            <a:pPr marL="0" indent="0">
-              <a:buNone/>
-            </a:pPr>
-            <a:endParaRPr lang="en-US" dirty="0"/>
-          </a:p>
-          <a:p>
-            <a:endParaRPr lang="en-US" dirty="0"/>
-          </a:p>
-          <a:p>
-            <a:endParaRPr lang="en-US" dirty="0"/>
-          </a:p>
-        </p:txBody>
-      </p:sp>
-      <p:sp>
-        <p:nvSpPr>
-          <p:cNvPr id="4" name="Slide Number Placeholder 3">
-            <a:extLst>
-              <a:ext uri="{FF2B5EF4-FFF2-40B4-BE49-F238E27FC236}">
-                <a16:creationId xmlns:a16="http://schemas.microsoft.com/office/drawing/2014/main" id="{481F7F5B-54DF-4CD2-A6C1-142EAD34FCFF}"/>
-              </a:ext>
-            </a:extLst>
-          </p:cNvPr>
-          <p:cNvSpPr>
-            <a:spLocks noGrp="1"/>
-          </p:cNvSpPr>
-          <p:nvPr>
-            <p:ph type="sldNum" sz="quarter" idx="12"/>
-          </p:nvPr>
-        </p:nvSpPr>
-        <p:spPr/>
-        <p:txBody>
-          <a:bodyPr/>
-          <a:lstStyle/>
-          <a:p>
-            <a:fld id="{F6728BC2-ACA3-447C-A909-F3F49211C066}" type="slidenum">
-              <a:rPr lang="en-US" smtClean="0"/>
-              <a:pPr/>
-              <a:t>17</a:t>
-            </a:fld>
-            <a:endParaRPr lang="en-US" dirty="0"/>
-          </a:p>
-        </p:txBody>
-      </p:sp>
-      <p:sp>
-        <p:nvSpPr>
-          <p:cNvPr id="6" name="Rectangle 5">
-            <a:extLst>
-              <a:ext uri="{FF2B5EF4-FFF2-40B4-BE49-F238E27FC236}">
-                <a16:creationId xmlns:a16="http://schemas.microsoft.com/office/drawing/2014/main" id="{1DCCAFDA-05E8-42C6-AD76-6D65D75E8DA5}"/>
-              </a:ext>
-            </a:extLst>
-          </p:cNvPr>
-          <p:cNvSpPr/>
-          <p:nvPr/>
-        </p:nvSpPr>
-        <p:spPr>
-          <a:xfrm>
-            <a:off x="455511" y="4008242"/>
-            <a:ext cx="8383980" cy="2538032"/>
-          </a:xfrm>
-          <a:prstGeom prst="rect">
-            <a:avLst/>
-          </a:prstGeom>
-        </p:spPr>
-        <p:style>
-          <a:lnRef idx="1">
-            <a:schemeClr val="accent2"/>
-          </a:lnRef>
-          <a:fillRef idx="2">
-            <a:schemeClr val="accent2"/>
-          </a:fillRef>
-          <a:effectRef idx="1">
-            <a:schemeClr val="accent2"/>
-          </a:effectRef>
-          <a:fontRef idx="minor">
-            <a:schemeClr val="dk1"/>
-          </a:fontRef>
-        </p:style>
-        <p:txBody>
-          <a:bodyPr rtlCol="0" anchor="ctr">
-            <a:normAutofit fontScale="92500" lnSpcReduction="20000"/>
-          </a:bodyPr>
-          <a:lstStyle/>
-          <a:p>
-            <a:pPr defTabSz="228600"/>
-            <a:r>
-              <a:rPr lang="en-US" sz="2000" b="1" dirty="0">
-                <a:latin typeface="+mj-lt"/>
-                <a:cs typeface="Courier New" panose="02070309020205020404" pitchFamily="49" charset="0"/>
-              </a:rPr>
-              <a:t>CREATE OR REPLACE PROCEDURE </a:t>
-            </a:r>
-            <a:r>
-              <a:rPr lang="en-US" sz="2000" dirty="0" err="1">
-                <a:latin typeface="+mj-lt"/>
-                <a:cs typeface="Courier New" panose="02070309020205020404" pitchFamily="49" charset="0"/>
-              </a:rPr>
-              <a:t>percentage_raise</a:t>
-            </a:r>
-            <a:r>
-              <a:rPr lang="en-US" sz="2000" dirty="0">
-                <a:latin typeface="+mj-lt"/>
-                <a:cs typeface="Courier New" panose="02070309020205020404" pitchFamily="49" charset="0"/>
-              </a:rPr>
-              <a:t>(</a:t>
-            </a:r>
-            <a:r>
-              <a:rPr lang="en-US" sz="2000" dirty="0" err="1">
-                <a:latin typeface="+mj-lt"/>
-                <a:cs typeface="Courier New" panose="02070309020205020404" pitchFamily="49" charset="0"/>
-              </a:rPr>
-              <a:t>current_sal</a:t>
-            </a:r>
-            <a:r>
-              <a:rPr lang="en-US" sz="2000" dirty="0">
-                <a:latin typeface="+mj-lt"/>
-                <a:cs typeface="Courier New" panose="02070309020205020404" pitchFamily="49" charset="0"/>
-              </a:rPr>
-              <a:t> </a:t>
-            </a:r>
-            <a:r>
-              <a:rPr lang="en-US" sz="2000" b="1" dirty="0">
-                <a:latin typeface="+mj-lt"/>
-                <a:cs typeface="Courier New" panose="02070309020205020404" pitchFamily="49" charset="0"/>
-              </a:rPr>
-              <a:t>INT</a:t>
-            </a:r>
-            <a:r>
-              <a:rPr lang="en-US" sz="2000" dirty="0">
-                <a:latin typeface="+mj-lt"/>
-                <a:cs typeface="Courier New" panose="02070309020205020404" pitchFamily="49" charset="0"/>
-              </a:rPr>
-              <a:t>, increase </a:t>
-            </a:r>
-            <a:r>
-              <a:rPr lang="en-US" sz="2000" b="1" dirty="0">
-                <a:latin typeface="+mj-lt"/>
-                <a:cs typeface="Courier New" panose="02070309020205020404" pitchFamily="49" charset="0"/>
-              </a:rPr>
-              <a:t>DEC, </a:t>
-            </a:r>
-            <a:r>
-              <a:rPr lang="en-US" sz="2000" dirty="0" err="1">
-                <a:latin typeface="+mj-lt"/>
-                <a:cs typeface="Courier New" panose="02070309020205020404" pitchFamily="49" charset="0"/>
-              </a:rPr>
-              <a:t>employee_id</a:t>
-            </a:r>
-            <a:r>
-              <a:rPr lang="en-US" sz="2000" dirty="0">
-                <a:latin typeface="+mj-lt"/>
-                <a:cs typeface="Courier New" panose="02070309020205020404" pitchFamily="49" charset="0"/>
-              </a:rPr>
-              <a:t> </a:t>
-            </a:r>
-            <a:r>
-              <a:rPr lang="en-US" sz="2000" b="1" dirty="0">
-                <a:latin typeface="+mj-lt"/>
-                <a:cs typeface="Courier New" panose="02070309020205020404" pitchFamily="49" charset="0"/>
-              </a:rPr>
-              <a:t>INT</a:t>
-            </a:r>
-            <a:r>
-              <a:rPr lang="en-US" sz="2000" dirty="0">
-                <a:latin typeface="+mj-lt"/>
-                <a:cs typeface="Courier New" panose="02070309020205020404" pitchFamily="49" charset="0"/>
-              </a:rPr>
-              <a:t>)</a:t>
-            </a:r>
-          </a:p>
-          <a:p>
-            <a:pPr defTabSz="228600"/>
-            <a:r>
-              <a:rPr lang="en-US" sz="2000" b="1" dirty="0">
-                <a:latin typeface="+mj-lt"/>
-                <a:cs typeface="Courier New" panose="02070309020205020404" pitchFamily="49" charset="0"/>
-              </a:rPr>
-              <a:t>LANGUAGE </a:t>
-            </a:r>
-            <a:r>
-              <a:rPr lang="en-US" sz="2000" dirty="0" err="1">
-                <a:latin typeface="+mj-lt"/>
-                <a:cs typeface="Courier New" panose="02070309020205020404" pitchFamily="49" charset="0"/>
-              </a:rPr>
-              <a:t>plsql</a:t>
-            </a:r>
-            <a:r>
-              <a:rPr lang="en-US" sz="2000" dirty="0">
-                <a:latin typeface="+mj-lt"/>
-                <a:cs typeface="Courier New" panose="02070309020205020404" pitchFamily="49" charset="0"/>
-              </a:rPr>
-              <a:t>	</a:t>
-            </a:r>
-          </a:p>
-          <a:p>
-            <a:pPr defTabSz="228600"/>
-            <a:r>
-              <a:rPr lang="en-US" sz="2000" b="1" dirty="0">
-                <a:latin typeface="+mj-lt"/>
-                <a:cs typeface="Courier New" panose="02070309020205020404" pitchFamily="49" charset="0"/>
-              </a:rPr>
-              <a:t>AS $$</a:t>
-            </a:r>
-          </a:p>
-          <a:p>
-            <a:pPr defTabSz="228600"/>
-            <a:r>
-              <a:rPr lang="en-US" sz="2000" b="1" dirty="0">
-                <a:latin typeface="+mj-lt"/>
-                <a:cs typeface="Courier New" panose="02070309020205020404" pitchFamily="49" charset="0"/>
-              </a:rPr>
-              <a:t>BEGIN</a:t>
-            </a:r>
-          </a:p>
-          <a:p>
-            <a:pPr defTabSz="228600"/>
-            <a:r>
-              <a:rPr lang="en-US" sz="2000" dirty="0">
-                <a:latin typeface="+mj-lt"/>
-                <a:cs typeface="Courier New" panose="02070309020205020404" pitchFamily="49" charset="0"/>
-              </a:rPr>
-              <a:t>	</a:t>
-            </a:r>
-            <a:r>
-              <a:rPr lang="en-US" sz="2000" b="1" dirty="0">
-                <a:latin typeface="+mj-lt"/>
-                <a:cs typeface="Courier New" panose="02070309020205020404" pitchFamily="49" charset="0"/>
-              </a:rPr>
-              <a:t>UPDATE </a:t>
-            </a:r>
-            <a:r>
-              <a:rPr lang="en-US" sz="2000" dirty="0" err="1">
-                <a:latin typeface="+mj-lt"/>
-                <a:cs typeface="Courier New" panose="02070309020205020404" pitchFamily="49" charset="0"/>
-              </a:rPr>
-              <a:t>example.employees</a:t>
-            </a:r>
-            <a:endParaRPr lang="en-US" sz="2000" dirty="0">
-              <a:latin typeface="+mj-lt"/>
-              <a:cs typeface="Courier New" panose="02070309020205020404" pitchFamily="49" charset="0"/>
-            </a:endParaRPr>
-          </a:p>
-          <a:p>
-            <a:pPr defTabSz="228600"/>
-            <a:r>
-              <a:rPr lang="en-US" sz="2000" dirty="0">
-                <a:latin typeface="+mj-lt"/>
-                <a:cs typeface="Courier New" panose="02070309020205020404" pitchFamily="49" charset="0"/>
-              </a:rPr>
-              <a:t>	</a:t>
-            </a:r>
-            <a:r>
-              <a:rPr lang="en-US" sz="2000" b="1" dirty="0">
-                <a:latin typeface="+mj-lt"/>
-                <a:cs typeface="Courier New" panose="02070309020205020404" pitchFamily="49" charset="0"/>
-              </a:rPr>
-              <a:t>SET </a:t>
-            </a:r>
-            <a:r>
-              <a:rPr lang="en-US" sz="2000" dirty="0" err="1">
-                <a:latin typeface="+mj-lt"/>
-                <a:cs typeface="Courier New" panose="02070309020205020404" pitchFamily="49" charset="0"/>
-              </a:rPr>
-              <a:t>emp_salary</a:t>
-            </a:r>
-            <a:r>
-              <a:rPr lang="en-US" sz="2000" dirty="0">
-                <a:latin typeface="+mj-lt"/>
-                <a:cs typeface="Courier New" panose="02070309020205020404" pitchFamily="49" charset="0"/>
-              </a:rPr>
-              <a:t> = </a:t>
-            </a:r>
-            <a:r>
-              <a:rPr lang="en-US" sz="2000" dirty="0" err="1">
-                <a:latin typeface="+mj-lt"/>
-                <a:cs typeface="Courier New" panose="02070309020205020404" pitchFamily="49" charset="0"/>
-              </a:rPr>
-              <a:t>current_sal</a:t>
-            </a:r>
-            <a:r>
-              <a:rPr lang="en-US" sz="2000" dirty="0">
-                <a:latin typeface="+mj-lt"/>
-                <a:cs typeface="Courier New" panose="02070309020205020404" pitchFamily="49" charset="0"/>
-              </a:rPr>
-              <a:t> * increase</a:t>
-            </a:r>
-          </a:p>
-          <a:p>
-            <a:pPr defTabSz="228600"/>
-            <a:r>
-              <a:rPr lang="en-US" sz="2000" b="1" dirty="0">
-                <a:latin typeface="+mj-lt"/>
-                <a:cs typeface="Courier New" panose="02070309020205020404" pitchFamily="49" charset="0"/>
-              </a:rPr>
-              <a:t>	WHERE </a:t>
-            </a:r>
-            <a:r>
-              <a:rPr lang="en-US" sz="2000" dirty="0" err="1">
-                <a:latin typeface="+mj-lt"/>
-                <a:cs typeface="Courier New" panose="02070309020205020404" pitchFamily="49" charset="0"/>
-              </a:rPr>
-              <a:t>emp_id</a:t>
-            </a:r>
-            <a:r>
-              <a:rPr lang="en-US" sz="2000" dirty="0">
-                <a:latin typeface="+mj-lt"/>
-                <a:cs typeface="Courier New" panose="02070309020205020404" pitchFamily="49" charset="0"/>
-              </a:rPr>
-              <a:t> = </a:t>
-            </a:r>
-            <a:r>
-              <a:rPr lang="en-US" sz="2000" dirty="0" err="1">
-                <a:latin typeface="+mj-lt"/>
-                <a:cs typeface="Courier New" panose="02070309020205020404" pitchFamily="49" charset="0"/>
-              </a:rPr>
-              <a:t>employee_id</a:t>
-            </a:r>
-            <a:r>
-              <a:rPr lang="en-US" sz="2000" dirty="0">
-                <a:latin typeface="+mj-lt"/>
-                <a:cs typeface="Courier New" panose="02070309020205020404" pitchFamily="49" charset="0"/>
-              </a:rPr>
-              <a:t>;  </a:t>
-            </a:r>
-          </a:p>
-          <a:p>
-            <a:pPr defTabSz="228600"/>
-            <a:r>
-              <a:rPr lang="en-US" sz="2000" b="1" dirty="0">
-                <a:latin typeface="+mj-lt"/>
-                <a:cs typeface="Courier New" panose="02070309020205020404" pitchFamily="49" charset="0"/>
-              </a:rPr>
-              <a:t>COMMIT</a:t>
-            </a:r>
-            <a:r>
-              <a:rPr lang="en-US" sz="2000" dirty="0">
-                <a:latin typeface="+mj-lt"/>
-                <a:cs typeface="Courier New" panose="02070309020205020404" pitchFamily="49" charset="0"/>
-              </a:rPr>
-              <a:t>;</a:t>
-            </a:r>
-          </a:p>
-          <a:p>
-            <a:pPr defTabSz="228600"/>
-            <a:r>
-              <a:rPr lang="en-US" sz="2000" b="1" dirty="0">
-                <a:latin typeface="+mj-lt"/>
-                <a:cs typeface="Courier New" panose="02070309020205020404" pitchFamily="49" charset="0"/>
-              </a:rPr>
-              <a:t>END;$$</a:t>
-            </a:r>
-            <a:endParaRPr lang="en-US" sz="2000" dirty="0">
-              <a:latin typeface="+mj-lt"/>
-              <a:cs typeface="Courier New" panose="02070309020205020404" pitchFamily="49" charset="0"/>
-            </a:endParaRPr>
-          </a:p>
-        </p:txBody>
-      </p:sp>
-    </p:spTree>
-    <p:extLst>
-      <p:ext uri="{BB962C8B-B14F-4D97-AF65-F5344CB8AC3E}">
-        <p14:creationId xmlns:p14="http://schemas.microsoft.com/office/powerpoint/2010/main" val="900233692"/>
       </p:ext>
     </p:extLst>
   </p:cSld>

</xml_diff>